<commit_message>
fixed ready and install pdf
</commit_message>
<xml_diff>
--- a/00-Resources/Intro-to-Python/TechnicalRequirements.pptx
+++ b/00-Resources/Intro-to-Python/TechnicalRequirements.pptx
@@ -200,7 +200,7 @@
           <a:p>
             <a:fld id="{8731D026-5A56-BF47-8C28-12A72CF57069}" type="datetimeFigureOut">
               <a:rPr lang="en-US" smtClean="0"/>
-              <a:t>12/6/16</a:t>
+              <a:t>1/9/17</a:t>
             </a:fld>
             <a:endParaRPr lang="en-US"/>
           </a:p>
@@ -1558,7 +1558,7 @@
           <a:p>
             <a:fld id="{B3EB7842-F039-8B44-BD44-4B4B7FE81B32}" type="datetimeFigureOut">
               <a:rPr lang="en-US" smtClean="0"/>
-              <a:t>12/6/16</a:t>
+              <a:t>1/9/17</a:t>
             </a:fld>
             <a:endParaRPr lang="en-US"/>
           </a:p>
@@ -1728,7 +1728,7 @@
           <a:p>
             <a:fld id="{B3EB7842-F039-8B44-BD44-4B4B7FE81B32}" type="datetimeFigureOut">
               <a:rPr lang="en-US" smtClean="0"/>
-              <a:t>12/6/16</a:t>
+              <a:t>1/9/17</a:t>
             </a:fld>
             <a:endParaRPr lang="en-US"/>
           </a:p>
@@ -1908,7 +1908,7 @@
           <a:p>
             <a:fld id="{B3EB7842-F039-8B44-BD44-4B4B7FE81B32}" type="datetimeFigureOut">
               <a:rPr lang="en-US" smtClean="0"/>
-              <a:t>12/6/16</a:t>
+              <a:t>1/9/17</a:t>
             </a:fld>
             <a:endParaRPr lang="en-US"/>
           </a:p>
@@ -2078,7 +2078,7 @@
           <a:p>
             <a:fld id="{B3EB7842-F039-8B44-BD44-4B4B7FE81B32}" type="datetimeFigureOut">
               <a:rPr lang="en-US" smtClean="0"/>
-              <a:t>12/6/16</a:t>
+              <a:t>1/9/17</a:t>
             </a:fld>
             <a:endParaRPr lang="en-US"/>
           </a:p>
@@ -2324,7 +2324,7 @@
           <a:p>
             <a:fld id="{B3EB7842-F039-8B44-BD44-4B4B7FE81B32}" type="datetimeFigureOut">
               <a:rPr lang="en-US" smtClean="0"/>
-              <a:t>12/6/16</a:t>
+              <a:t>1/9/17</a:t>
             </a:fld>
             <a:endParaRPr lang="en-US"/>
           </a:p>
@@ -2612,7 +2612,7 @@
           <a:p>
             <a:fld id="{B3EB7842-F039-8B44-BD44-4B4B7FE81B32}" type="datetimeFigureOut">
               <a:rPr lang="en-US" smtClean="0"/>
-              <a:t>12/6/16</a:t>
+              <a:t>1/9/17</a:t>
             </a:fld>
             <a:endParaRPr lang="en-US"/>
           </a:p>
@@ -3034,7 +3034,7 @@
           <a:p>
             <a:fld id="{B3EB7842-F039-8B44-BD44-4B4B7FE81B32}" type="datetimeFigureOut">
               <a:rPr lang="en-US" smtClean="0"/>
-              <a:t>12/6/16</a:t>
+              <a:t>1/9/17</a:t>
             </a:fld>
             <a:endParaRPr lang="en-US"/>
           </a:p>
@@ -3152,7 +3152,7 @@
           <a:p>
             <a:fld id="{B3EB7842-F039-8B44-BD44-4B4B7FE81B32}" type="datetimeFigureOut">
               <a:rPr lang="en-US" smtClean="0"/>
-              <a:t>12/6/16</a:t>
+              <a:t>1/9/17</a:t>
             </a:fld>
             <a:endParaRPr lang="en-US"/>
           </a:p>
@@ -3247,7 +3247,7 @@
           <a:p>
             <a:fld id="{B3EB7842-F039-8B44-BD44-4B4B7FE81B32}" type="datetimeFigureOut">
               <a:rPr lang="en-US" smtClean="0"/>
-              <a:t>12/6/16</a:t>
+              <a:t>1/9/17</a:t>
             </a:fld>
             <a:endParaRPr lang="en-US"/>
           </a:p>
@@ -3524,7 +3524,7 @@
           <a:p>
             <a:fld id="{B3EB7842-F039-8B44-BD44-4B4B7FE81B32}" type="datetimeFigureOut">
               <a:rPr lang="en-US" smtClean="0"/>
-              <a:t>12/6/16</a:t>
+              <a:t>1/9/17</a:t>
             </a:fld>
             <a:endParaRPr lang="en-US"/>
           </a:p>
@@ -3777,7 +3777,7 @@
           <a:p>
             <a:fld id="{B3EB7842-F039-8B44-BD44-4B4B7FE81B32}" type="datetimeFigureOut">
               <a:rPr lang="en-US" smtClean="0"/>
-              <a:t>12/6/16</a:t>
+              <a:t>1/9/17</a:t>
             </a:fld>
             <a:endParaRPr lang="en-US"/>
           </a:p>
@@ -3990,7 +3990,7 @@
           <a:p>
             <a:fld id="{B3EB7842-F039-8B44-BD44-4B4B7FE81B32}" type="datetimeFigureOut">
               <a:rPr lang="en-US" smtClean="0"/>
-              <a:t>12/6/16</a:t>
+              <a:t>1/9/17</a:t>
             </a:fld>
             <a:endParaRPr lang="en-US"/>
           </a:p>
@@ -4417,11 +4417,7 @@
             </a:pPr>
             <a:r>
               <a:rPr lang="en-US" dirty="0" smtClean="0"/>
-              <a:t>This workshop will be delivered </a:t>
-            </a:r>
-            <a:r>
-              <a:rPr lang="en-US" dirty="0" smtClean="0"/>
-              <a:t>through an </a:t>
+              <a:t>This workshop will be delivered through an </a:t>
             </a:r>
             <a:r>
               <a:rPr lang="en-US" dirty="0" err="1" smtClean="0"/>
@@ -4437,7 +4433,23 @@
             </a:r>
             <a:r>
               <a:rPr lang="en-US" dirty="0" smtClean="0"/>
-              <a:t> Notebooks before arriving at the workshop.  If you would like help getting set up, you may want to arrive at 3:30 (30 minutes prior to the start of the workshop) to receive help with installing the required components for the workshop.</a:t>
+              <a:t> Notebooks before arriving at the workshop.  If you would like help getting set up, you may want to arrive at </a:t>
+            </a:r>
+            <a:r>
+              <a:rPr lang="en-US" dirty="0" smtClean="0"/>
+              <a:t>1pm(</a:t>
+            </a:r>
+            <a:r>
+              <a:rPr lang="en-US" dirty="0"/>
+              <a:t>6</a:t>
+            </a:r>
+            <a:r>
+              <a:rPr lang="en-US" dirty="0" smtClean="0"/>
+              <a:t>0 </a:t>
+            </a:r>
+            <a:r>
+              <a:rPr lang="en-US" dirty="0" smtClean="0"/>
+              <a:t>minutes prior to the start of the workshop) to receive help with installing the required components for the workshop.</a:t>
             </a:r>
           </a:p>
           <a:p>
@@ -4462,7 +4474,6 @@
               <a:rPr lang="en-US" dirty="0" smtClean="0"/>
               <a:t> notebook, we recommend the following (instructions to follow):</a:t>
             </a:r>
-            <a:endParaRPr lang="en-US" dirty="0" smtClean="0"/>
           </a:p>
           <a:p>
             <a:r>
@@ -4512,12 +4523,11 @@
           <a:p>
             <a:pPr lvl="1"/>
             <a:r>
-              <a:rPr lang="en-US" dirty="0" smtClean="0">
+              <a:rPr lang="en-US" dirty="0">
                 <a:hlinkClick r:id="rId4"/>
               </a:rPr>
-              <a:t>https://github.com/BeniamG/Text_Analysis_Fundamentals_3session</a:t>
-            </a:r>
-            <a:endParaRPr lang="en-US" dirty="0" smtClean="0"/>
+              <a:t>https://github.com/BeniamG/Computational_Text_Analysis_4session</a:t>
+            </a:r>
           </a:p>
           <a:p>
             <a:r>
@@ -4530,15 +4540,7 @@
             </a:r>
             <a:r>
               <a:rPr lang="en-US" dirty="0" smtClean="0"/>
-              <a:t> </a:t>
-            </a:r>
-            <a:r>
-              <a:rPr lang="en-US" dirty="0" err="1" smtClean="0"/>
-              <a:t>Notbook</a:t>
-            </a:r>
-            <a:r>
-              <a:rPr lang="en-US" dirty="0" smtClean="0"/>
-              <a:t> “Installation </a:t>
+              <a:t> Notebook “Installation </a:t>
             </a:r>
             <a:r>
               <a:rPr lang="en-US" dirty="0" err="1" smtClean="0"/>
@@ -4553,7 +4555,11 @@
             <a:pPr lvl="1"/>
             <a:r>
               <a:rPr lang="en-US" dirty="0" smtClean="0"/>
-              <a:t>Text_Analysis_Fundamentals_3session/00-Resources/Installation </a:t>
+              <a:t>Text_Analysis_Fundamentals_3session</a:t>
+            </a:r>
+            <a:r>
+              <a:rPr lang="en-US" dirty="0" smtClean="0"/>
+              <a:t>/00-Resources/Installation </a:t>
             </a:r>
             <a:r>
               <a:rPr lang="en-US" dirty="0" err="1" smtClean="0"/>
@@ -5031,11 +5037,7 @@
             </a:r>
             <a:r>
               <a:rPr lang="en-US" dirty="0" smtClean="0"/>
-              <a:t> </a:t>
-            </a:r>
-            <a:r>
-              <a:rPr lang="en-US" dirty="0" smtClean="0"/>
-              <a:t>Repository</a:t>
+              <a:t> Repository</a:t>
             </a:r>
             <a:br>
               <a:rPr lang="en-US" dirty="0" smtClean="0"/>
@@ -5187,11 +5189,7 @@
           <a:p>
             <a:r>
               <a:rPr lang="en-US" dirty="0" smtClean="0"/>
-              <a:t>Launch </a:t>
-            </a:r>
-            <a:r>
-              <a:rPr lang="en-US" dirty="0" smtClean="0"/>
-              <a:t>Anaconda-Navigator</a:t>
+              <a:t>Launch Anaconda-Navigator</a:t>
             </a:r>
             <a:endParaRPr lang="en-US" dirty="0"/>
           </a:p>
@@ -5555,11 +5553,7 @@
           <a:p>
             <a:r>
               <a:rPr lang="en-US" dirty="0" smtClean="0"/>
-              <a:t>Run </a:t>
-            </a:r>
-            <a:r>
-              <a:rPr lang="en-US" dirty="0" smtClean="0"/>
-              <a:t>“Installation </a:t>
+              <a:t>Run “Installation </a:t>
             </a:r>
             <a:r>
               <a:rPr lang="en-US" dirty="0" err="1" smtClean="0"/>
@@ -5568,21 +5562,13 @@
             <a:r>
               <a:rPr lang="en-US" dirty="0" smtClean="0"/>
               <a:t>”</a:t>
-            </a:r>
-            <a:r>
-              <a:rPr lang="en-US" dirty="0" smtClean="0"/>
-              <a:t/>
             </a:r>
             <a:br>
               <a:rPr lang="en-US" dirty="0" smtClean="0"/>
             </a:br>
             <a:r>
               <a:rPr lang="en-US" sz="1600" dirty="0"/>
-              <a:t>W</a:t>
-            </a:r>
-            <a:r>
-              <a:rPr lang="en-US" sz="1600" dirty="0"/>
-              <a:t>ithin </a:t>
+              <a:t>Within </a:t>
             </a:r>
             <a:r>
               <a:rPr lang="en-US" sz="1600" dirty="0" err="1"/>
@@ -5590,19 +5576,7 @@
             </a:r>
             <a:r>
               <a:rPr lang="en-US" sz="1600" dirty="0"/>
-              <a:t> </a:t>
-            </a:r>
-            <a:r>
-              <a:rPr lang="en-US" sz="1600" dirty="0"/>
-              <a:t>Repository: Text_Analysis_Fundamentals_3session/00</a:t>
-            </a:r>
-            <a:r>
-              <a:rPr lang="en-US" sz="1600" dirty="0"/>
-              <a:t>-</a:t>
-            </a:r>
-            <a:r>
-              <a:rPr lang="en-US" sz="1600" dirty="0"/>
-              <a:t>Resources</a:t>
+              <a:t> Repository: Text_Analysis_Fundamentals_3session/00-Resources</a:t>
             </a:r>
             <a:r>
               <a:rPr lang="en-US" sz="1600" dirty="0" smtClean="0"/>

</xml_diff>